<commit_message>
Updated materials update after lesson
</commit_message>
<xml_diff>
--- a/4.DelegatesAndEvents/DelegatesAndEvents.pptx
+++ b/4.DelegatesAndEvents/DelegatesAndEvents.pptx
@@ -19366,7 +19366,7 @@
               <a:buNone/>
             </a:pPr>
             <a:r>
-              <a:rPr lang="ru-RU" sz="2000" dirty="0">
+              <a:rPr lang="ru-RU" sz="2000">
                 <a:solidFill>
                   <a:srgbClr val="262626"/>
                 </a:solidFill>
@@ -19375,7 +19375,19 @@
                 <a:cs typeface="Roboto"/>
                 <a:sym typeface="Roboto"/>
               </a:rPr>
-              <a:t>Это блок кода заключеный в фигурные скобки, которое можно присвоить делегату. При этом теряется необходимость создавать отдельный метод.</a:t>
+              <a:t>Это набор действий </a:t>
+            </a:r>
+            <a:r>
+              <a:rPr lang="ru-RU" sz="2000" dirty="0">
+                <a:solidFill>
+                  <a:srgbClr val="262626"/>
+                </a:solidFill>
+                <a:latin typeface="Roboto"/>
+                <a:ea typeface="Roboto"/>
+                <a:cs typeface="Roboto"/>
+                <a:sym typeface="Roboto"/>
+              </a:rPr>
+              <a:t>заключеный в фигурные скобки, которое можно присвоить делегату. При этом теряется необходимость создавать отдельный метод.</a:t>
             </a:r>
             <a:endParaRPr sz="2000" i="0" u="none" strike="noStrike" cap="none" dirty="0">
               <a:solidFill>
@@ -19924,7 +19936,7 @@
               <a:buNone/>
             </a:pPr>
             <a:r>
-              <a:rPr lang="ru-RU" sz="4100" b="1" i="0" u="none" strike="noStrike" cap="none" dirty="0">
+              <a:rPr lang="ru-RU" sz="4100" b="1" i="0" u="none" strike="noStrike" cap="none">
                 <a:solidFill>
                   <a:schemeClr val="dk1"/>
                 </a:solidFill>
@@ -19933,7 +19945,40 @@
                 <a:cs typeface="Roboto"/>
                 <a:sym typeface="Roboto"/>
               </a:rPr>
-              <a:t>Ламбда выражения</a:t>
+              <a:t>Л</a:t>
+            </a:r>
+            <a:r>
+              <a:rPr lang="ru-RU" sz="4100" b="1">
+                <a:latin typeface="Roboto"/>
+                <a:ea typeface="Roboto"/>
+                <a:cs typeface="Roboto"/>
+                <a:sym typeface="Roboto"/>
+              </a:rPr>
+              <a:t>я</a:t>
+            </a:r>
+            <a:r>
+              <a:rPr lang="ru-RU" sz="4100" b="1" i="0" u="none" strike="noStrike" cap="none">
+                <a:solidFill>
+                  <a:schemeClr val="dk1"/>
+                </a:solidFill>
+                <a:latin typeface="Roboto"/>
+                <a:ea typeface="Roboto"/>
+                <a:cs typeface="Roboto"/>
+                <a:sym typeface="Roboto"/>
+              </a:rPr>
+              <a:t>мбда </a:t>
+            </a:r>
+            <a:r>
+              <a:rPr lang="ru-RU" sz="4100" b="1" i="0" u="none" strike="noStrike" cap="none" dirty="0">
+                <a:solidFill>
+                  <a:schemeClr val="dk1"/>
+                </a:solidFill>
+                <a:latin typeface="Roboto"/>
+                <a:ea typeface="Roboto"/>
+                <a:cs typeface="Roboto"/>
+                <a:sym typeface="Roboto"/>
+              </a:rPr>
+              <a:t>выражения</a:t>
             </a:r>
             <a:endParaRPr sz="4100" b="1" i="0" u="none" strike="noStrike" cap="none" dirty="0">
               <a:solidFill>

</xml_diff>